<commit_message>
Add Readme, add exercise questions, beautify illustration code
</commit_message>
<xml_diff>
--- a/Lecture2/Teaching Presentation.pptx
+++ b/Lecture2/Teaching Presentation.pptx
@@ -108,6 +108,11 @@
       </a:defRPr>
     </a:lvl9pPr>
   </p:defaultTextStyle>
+  <p:extLst>
+    <p:ext uri="{EFAFB233-063F-42B5-8137-9DF3F51BA10A}">
+      <p15:sldGuideLst xmlns:p15="http://schemas.microsoft.com/office/powerpoint/2012/main"/>
+    </p:ext>
+  </p:extLst>
 </p:presentation>
 </file>
 
@@ -297,7 +302,7 @@
           <a:p>
             <a:fld id="{1D0B46A9-FA61-44B1-8511-267E0DE57512}" type="datetimeFigureOut">
               <a:rPr lang="en-IN" smtClean="0"/>
-              <a:t>12-03-2020</a:t>
+              <a:t>19-03-2020</a:t>
             </a:fld>
             <a:endParaRPr lang="en-IN"/>
           </a:p>
@@ -572,7 +577,7 @@
           <a:p>
             <a:fld id="{1D0B46A9-FA61-44B1-8511-267E0DE57512}" type="datetimeFigureOut">
               <a:rPr lang="en-IN" smtClean="0"/>
-              <a:t>12-03-2020</a:t>
+              <a:t>19-03-2020</a:t>
             </a:fld>
             <a:endParaRPr lang="en-IN"/>
           </a:p>
@@ -766,7 +771,7 @@
           <a:p>
             <a:fld id="{1D0B46A9-FA61-44B1-8511-267E0DE57512}" type="datetimeFigureOut">
               <a:rPr lang="en-IN" smtClean="0"/>
-              <a:t>12-03-2020</a:t>
+              <a:t>19-03-2020</a:t>
             </a:fld>
             <a:endParaRPr lang="en-IN"/>
           </a:p>
@@ -1039,7 +1044,7 @@
           <a:p>
             <a:fld id="{1D0B46A9-FA61-44B1-8511-267E0DE57512}" type="datetimeFigureOut">
               <a:rPr lang="en-IN" smtClean="0"/>
-              <a:t>12-03-2020</a:t>
+              <a:t>19-03-2020</a:t>
             </a:fld>
             <a:endParaRPr lang="en-IN"/>
           </a:p>
@@ -1380,7 +1385,7 @@
           <a:p>
             <a:fld id="{1D0B46A9-FA61-44B1-8511-267E0DE57512}" type="datetimeFigureOut">
               <a:rPr lang="en-IN" smtClean="0"/>
-              <a:t>12-03-2020</a:t>
+              <a:t>19-03-2020</a:t>
             </a:fld>
             <a:endParaRPr lang="en-IN"/>
           </a:p>
@@ -2003,7 +2008,7 @@
           <a:p>
             <a:fld id="{1D0B46A9-FA61-44B1-8511-267E0DE57512}" type="datetimeFigureOut">
               <a:rPr lang="en-IN" smtClean="0"/>
-              <a:t>12-03-2020</a:t>
+              <a:t>19-03-2020</a:t>
             </a:fld>
             <a:endParaRPr lang="en-IN"/>
           </a:p>
@@ -2863,7 +2868,7 @@
           <a:p>
             <a:fld id="{1D0B46A9-FA61-44B1-8511-267E0DE57512}" type="datetimeFigureOut">
               <a:rPr lang="en-IN" smtClean="0"/>
-              <a:t>12-03-2020</a:t>
+              <a:t>19-03-2020</a:t>
             </a:fld>
             <a:endParaRPr lang="en-IN"/>
           </a:p>
@@ -3033,7 +3038,7 @@
           <a:p>
             <a:fld id="{1D0B46A9-FA61-44B1-8511-267E0DE57512}" type="datetimeFigureOut">
               <a:rPr lang="en-IN" smtClean="0"/>
-              <a:t>12-03-2020</a:t>
+              <a:t>19-03-2020</a:t>
             </a:fld>
             <a:endParaRPr lang="en-IN"/>
           </a:p>
@@ -3213,7 +3218,7 @@
           <a:p>
             <a:fld id="{1D0B46A9-FA61-44B1-8511-267E0DE57512}" type="datetimeFigureOut">
               <a:rPr lang="en-IN" smtClean="0"/>
-              <a:t>12-03-2020</a:t>
+              <a:t>19-03-2020</a:t>
             </a:fld>
             <a:endParaRPr lang="en-IN"/>
           </a:p>
@@ -3383,7 +3388,7 @@
           <a:p>
             <a:fld id="{1D0B46A9-FA61-44B1-8511-267E0DE57512}" type="datetimeFigureOut">
               <a:rPr lang="en-IN" smtClean="0"/>
-              <a:t>12-03-2020</a:t>
+              <a:t>19-03-2020</a:t>
             </a:fld>
             <a:endParaRPr lang="en-IN"/>
           </a:p>
@@ -3630,7 +3635,7 @@
           <a:p>
             <a:fld id="{1D0B46A9-FA61-44B1-8511-267E0DE57512}" type="datetimeFigureOut">
               <a:rPr lang="en-IN" smtClean="0"/>
-              <a:t>12-03-2020</a:t>
+              <a:t>19-03-2020</a:t>
             </a:fld>
             <a:endParaRPr lang="en-IN"/>
           </a:p>
@@ -3922,7 +3927,7 @@
           <a:p>
             <a:fld id="{1D0B46A9-FA61-44B1-8511-267E0DE57512}" type="datetimeFigureOut">
               <a:rPr lang="en-IN" smtClean="0"/>
-              <a:t>12-03-2020</a:t>
+              <a:t>19-03-2020</a:t>
             </a:fld>
             <a:endParaRPr lang="en-IN"/>
           </a:p>
@@ -4366,7 +4371,7 @@
           <a:p>
             <a:fld id="{1D0B46A9-FA61-44B1-8511-267E0DE57512}" type="datetimeFigureOut">
               <a:rPr lang="en-IN" smtClean="0"/>
-              <a:t>12-03-2020</a:t>
+              <a:t>19-03-2020</a:t>
             </a:fld>
             <a:endParaRPr lang="en-IN"/>
           </a:p>
@@ -4484,7 +4489,7 @@
           <a:p>
             <a:fld id="{1D0B46A9-FA61-44B1-8511-267E0DE57512}" type="datetimeFigureOut">
               <a:rPr lang="en-IN" smtClean="0"/>
-              <a:t>12-03-2020</a:t>
+              <a:t>19-03-2020</a:t>
             </a:fld>
             <a:endParaRPr lang="en-IN"/>
           </a:p>
@@ -4579,7 +4584,7 @@
           <a:p>
             <a:fld id="{1D0B46A9-FA61-44B1-8511-267E0DE57512}" type="datetimeFigureOut">
               <a:rPr lang="en-IN" smtClean="0"/>
-              <a:t>12-03-2020</a:t>
+              <a:t>19-03-2020</a:t>
             </a:fld>
             <a:endParaRPr lang="en-IN"/>
           </a:p>
@@ -4858,7 +4863,7 @@
           <a:p>
             <a:fld id="{1D0B46A9-FA61-44B1-8511-267E0DE57512}" type="datetimeFigureOut">
               <a:rPr lang="en-IN" smtClean="0"/>
-              <a:t>12-03-2020</a:t>
+              <a:t>19-03-2020</a:t>
             </a:fld>
             <a:endParaRPr lang="en-IN"/>
           </a:p>
@@ -5133,7 +5138,7 @@
           <a:p>
             <a:fld id="{1D0B46A9-FA61-44B1-8511-267E0DE57512}" type="datetimeFigureOut">
               <a:rPr lang="en-IN" smtClean="0"/>
-              <a:t>12-03-2020</a:t>
+              <a:t>19-03-2020</a:t>
             </a:fld>
             <a:endParaRPr lang="en-IN"/>
           </a:p>
@@ -5562,7 +5567,7 @@
           <a:p>
             <a:fld id="{1D0B46A9-FA61-44B1-8511-267E0DE57512}" type="datetimeFigureOut">
               <a:rPr lang="en-IN" smtClean="0"/>
-              <a:t>12-03-2020</a:t>
+              <a:t>19-03-2020</a:t>
             </a:fld>
             <a:endParaRPr lang="en-IN"/>
           </a:p>
@@ -6540,8 +6545,25 @@
             </a:r>
             <a:r>
               <a:rPr lang="en-US" dirty="0" smtClean="0"/>
-              <a:t> = ‘Please be ready @ 5 pm!’</a:t>
-            </a:r>
+              <a:t> = ‘Please </a:t>
+            </a:r>
+            <a:r>
+              <a:rPr lang="en-US" smtClean="0"/>
+              <a:t>be </a:t>
+            </a:r>
+            <a:r>
+              <a:rPr lang="en-US" smtClean="0"/>
+              <a:t>ready at </a:t>
+            </a:r>
+            <a:r>
+              <a:rPr lang="en-US" smtClean="0"/>
+              <a:t>5 </a:t>
+            </a:r>
+            <a:r>
+              <a:rPr lang="en-US" smtClean="0"/>
+              <a:t>pm’</a:t>
+            </a:r>
+            <a:endParaRPr lang="en-US" dirty="0" smtClean="0"/>
           </a:p>
           <a:p>
             <a:pPr marL="457200" lvl="1" indent="0">

</xml_diff>